<commit_message>
Fix filepath, add prototype Quarto document
</commit_message>
<xml_diff>
--- a/Formal/Prototype_Presentation.pptx
+++ b/Formal/Prototype_Presentation.pptx
@@ -173,8 +173,8 @@
         </p:nvSpPr>
         <p:spPr>
           <a:xfrm>
-            <a:off x="567814" y="1777179"/>
-            <a:ext cx="8008376" cy="1496962"/>
+            <a:off x="1585452" y="1968909"/>
+            <a:ext cx="7005484" cy="1496963"/>
           </a:xfrm>
           <a:noFill/>
           <a:effectLst>
@@ -190,10 +190,10 @@
             <a:normAutofit/>
           </a:bodyPr>
           <a:lstStyle>
-            <a:lvl1pPr algn="l">
+            <a:lvl1pPr algn="r">
               <a:defRPr sz="3600">
                 <a:solidFill>
-                  <a:schemeClr val="bg1"/>
+                  <a:srgbClr val="002060"/>
                 </a:solidFill>
               </a:defRPr>
             </a:lvl1pPr>
@@ -233,8 +233,8 @@
         </p:nvSpPr>
         <p:spPr>
           <a:xfrm>
-            <a:off x="575187" y="3318385"/>
-            <a:ext cx="8001000" cy="678426"/>
+            <a:off x="1216742" y="3709220"/>
+            <a:ext cx="7382308" cy="678426"/>
           </a:xfrm>
         </p:spPr>
         <p:txBody>
@@ -242,12 +242,13 @@
             <a:normAutofit/>
           </a:bodyPr>
           <a:lstStyle>
-            <a:lvl1pPr marL="0" indent="0" algn="l">
+            <a:lvl1pPr marL="0" indent="0" algn="r">
               <a:buNone/>
               <a:defRPr sz="2800" b="0" i="0">
                 <a:solidFill>
-                  <a:schemeClr val="tx2">
-                    <a:lumMod val="50000"/>
+                  <a:schemeClr val="accent5">
+                    <a:lumMod val="20000"/>
+                    <a:lumOff val="80000"/>
                   </a:schemeClr>
                 </a:solidFill>
               </a:defRPr>
@@ -367,7 +368,7 @@
             <a:fld id="{53074F12-AA26-4AC8-9962-C36BB8F32554}" type="datetimeFigureOut">
               <a:rPr lang="en-US" smtClean="0"/>
               <a:pPr/>
-              <a:t>10/11/2018</a:t>
+              <a:t>8/6/2018</a:t>
             </a:fld>
             <a:endParaRPr lang="en-US"/>
           </a:p>
@@ -621,7 +622,7 @@
             <a:fld id="{53074F12-AA26-4AC8-9962-C36BB8F32554}" type="datetimeFigureOut">
               <a:rPr lang="en-US" smtClean="0"/>
               <a:pPr/>
-              <a:t>10/11/2018</a:t>
+              <a:t>8/6/2018</a:t>
             </a:fld>
             <a:endParaRPr lang="en-US"/>
           </a:p>
@@ -791,7 +792,7 @@
             <a:fld id="{53074F12-AA26-4AC8-9962-C36BB8F32554}" type="datetimeFigureOut">
               <a:rPr lang="en-US" smtClean="0"/>
               <a:pPr/>
-              <a:t>10/11/2018</a:t>
+              <a:t>8/6/2018</a:t>
             </a:fld>
             <a:endParaRPr lang="en-US"/>
           </a:p>
@@ -971,7 +972,7 @@
             <a:fld id="{53074F12-AA26-4AC8-9962-C36BB8F32554}" type="datetimeFigureOut">
               <a:rPr lang="en-US" smtClean="0"/>
               <a:pPr/>
-              <a:t>10/11/2018</a:t>
+              <a:t>8/6/2018</a:t>
             </a:fld>
             <a:endParaRPr lang="en-US"/>
           </a:p>
@@ -1111,7 +1112,7 @@
         </p:nvSpPr>
         <p:spPr>
           <a:xfrm>
-            <a:off x="449824" y="231711"/>
+            <a:off x="464573" y="290705"/>
             <a:ext cx="8259098" cy="763526"/>
           </a:xfrm>
         </p:spPr>
@@ -1120,10 +1121,13 @@
             <a:normAutofit/>
           </a:bodyPr>
           <a:lstStyle>
-            <a:lvl1pPr algn="l">
+            <a:lvl1pPr algn="r">
               <a:defRPr sz="3600" baseline="0">
                 <a:solidFill>
-                  <a:schemeClr val="bg1"/>
+                  <a:schemeClr val="accent5">
+                    <a:lumMod val="20000"/>
+                    <a:lumOff val="80000"/>
+                  </a:schemeClr>
                 </a:solidFill>
                 <a:effectLst>
                   <a:outerShdw blurRad="50800" dist="38100" dir="2700000" algn="tl" rotWithShape="0">
@@ -1155,8 +1159,8 @@
         </p:nvSpPr>
         <p:spPr>
           <a:xfrm>
-            <a:off x="463714" y="1179871"/>
-            <a:ext cx="8246070" cy="3598603"/>
+            <a:off x="463714" y="1334728"/>
+            <a:ext cx="8246070" cy="3443747"/>
           </a:xfrm>
         </p:spPr>
         <p:txBody>
@@ -1165,45 +1169,35 @@
             <a:lvl1pPr algn="l">
               <a:defRPr sz="2800">
                 <a:solidFill>
-                  <a:schemeClr val="tx2">
-                    <a:lumMod val="50000"/>
-                  </a:schemeClr>
+                  <a:schemeClr val="tx1"/>
                 </a:solidFill>
               </a:defRPr>
             </a:lvl1pPr>
             <a:lvl2pPr algn="l">
               <a:defRPr>
                 <a:solidFill>
-                  <a:schemeClr val="tx2">
-                    <a:lumMod val="50000"/>
-                  </a:schemeClr>
+                  <a:schemeClr val="tx1"/>
                 </a:solidFill>
               </a:defRPr>
             </a:lvl2pPr>
             <a:lvl3pPr algn="l">
               <a:defRPr>
                 <a:solidFill>
-                  <a:schemeClr val="tx2">
-                    <a:lumMod val="50000"/>
-                  </a:schemeClr>
+                  <a:schemeClr val="tx1"/>
                 </a:solidFill>
               </a:defRPr>
             </a:lvl3pPr>
             <a:lvl4pPr algn="l">
               <a:defRPr>
                 <a:solidFill>
-                  <a:schemeClr val="tx2">
-                    <a:lumMod val="50000"/>
-                  </a:schemeClr>
+                  <a:schemeClr val="tx1"/>
                 </a:solidFill>
               </a:defRPr>
             </a:lvl4pPr>
             <a:lvl5pPr algn="l">
               <a:defRPr>
                 <a:solidFill>
-                  <a:schemeClr val="tx2">
-                    <a:lumMod val="50000"/>
-                  </a:schemeClr>
+                  <a:schemeClr val="tx1"/>
                 </a:solidFill>
               </a:defRPr>
             </a:lvl5pPr>
@@ -1263,7 +1257,7 @@
             <a:fld id="{53074F12-AA26-4AC8-9962-C36BB8F32554}" type="datetimeFigureOut">
               <a:rPr lang="en-US" smtClean="0"/>
               <a:pPr/>
-              <a:t>10/11/2018</a:t>
+              <a:t>8/6/2018</a:t>
             </a:fld>
             <a:endParaRPr lang="en-US"/>
           </a:p>
@@ -1368,8 +1362,8 @@
         </p:nvSpPr>
         <p:spPr>
           <a:xfrm>
-            <a:off x="479616" y="413911"/>
-            <a:ext cx="6474869" cy="725349"/>
+            <a:off x="1885289" y="318046"/>
+            <a:ext cx="6827643" cy="725349"/>
           </a:xfrm>
         </p:spPr>
         <p:txBody>
@@ -1380,7 +1374,10 @@
             <a:lvl1pPr algn="l">
               <a:defRPr sz="3600">
                 <a:solidFill>
-                  <a:schemeClr val="bg1"/>
+                  <a:schemeClr val="accent5">
+                    <a:lumMod val="20000"/>
+                    <a:lumOff val="80000"/>
+                  </a:schemeClr>
                 </a:solidFill>
                 <a:effectLst>
                   <a:outerShdw blurRad="50800" dist="38100" dir="2700000" algn="tl" rotWithShape="0">
@@ -1412,8 +1409,8 @@
         </p:nvSpPr>
         <p:spPr>
           <a:xfrm>
-            <a:off x="479322" y="1150374"/>
-            <a:ext cx="6496665" cy="3545497"/>
+            <a:off x="1880419" y="1069258"/>
+            <a:ext cx="6850625" cy="3619239"/>
           </a:xfrm>
         </p:spPr>
         <p:txBody>
@@ -1422,45 +1419,35 @@
             <a:lvl1pPr>
               <a:defRPr sz="2800">
                 <a:solidFill>
-                  <a:schemeClr val="tx2">
-                    <a:lumMod val="50000"/>
-                  </a:schemeClr>
+                  <a:schemeClr val="bg1"/>
                 </a:solidFill>
               </a:defRPr>
             </a:lvl1pPr>
             <a:lvl2pPr>
               <a:defRPr>
                 <a:solidFill>
-                  <a:schemeClr val="tx2">
-                    <a:lumMod val="50000"/>
-                  </a:schemeClr>
+                  <a:schemeClr val="bg1"/>
                 </a:solidFill>
               </a:defRPr>
             </a:lvl2pPr>
             <a:lvl3pPr>
               <a:defRPr>
                 <a:solidFill>
-                  <a:schemeClr val="tx2">
-                    <a:lumMod val="50000"/>
-                  </a:schemeClr>
+                  <a:schemeClr val="bg1"/>
                 </a:solidFill>
               </a:defRPr>
             </a:lvl3pPr>
             <a:lvl4pPr>
               <a:defRPr>
                 <a:solidFill>
-                  <a:schemeClr val="tx2">
-                    <a:lumMod val="50000"/>
-                  </a:schemeClr>
+                  <a:schemeClr val="bg1"/>
                 </a:solidFill>
               </a:defRPr>
             </a:lvl4pPr>
             <a:lvl5pPr>
               <a:defRPr>
                 <a:solidFill>
-                  <a:schemeClr val="tx2">
-                    <a:lumMod val="50000"/>
-                  </a:schemeClr>
+                  <a:schemeClr val="bg1"/>
                 </a:solidFill>
               </a:defRPr>
             </a:lvl5pPr>
@@ -1520,7 +1507,7 @@
             <a:fld id="{53074F12-AA26-4AC8-9962-C36BB8F32554}" type="datetimeFigureOut">
               <a:rPr lang="en-US" smtClean="0"/>
               <a:pPr/>
-              <a:t>10/11/2018</a:t>
+              <a:t>8/6/2018</a:t>
             </a:fld>
             <a:endParaRPr lang="en-US"/>
           </a:p>
@@ -1767,7 +1754,7 @@
             <a:fld id="{53074F12-AA26-4AC8-9962-C36BB8F32554}" type="datetimeFigureOut">
               <a:rPr lang="en-US" smtClean="0"/>
               <a:pPr/>
-              <a:t>10/11/2018</a:t>
+              <a:t>8/6/2018</a:t>
             </a:fld>
             <a:endParaRPr lang="en-US"/>
           </a:p>
@@ -2054,7 +2041,7 @@
             <a:fld id="{53074F12-AA26-4AC8-9962-C36BB8F32554}" type="datetimeFigureOut">
               <a:rPr lang="en-US" smtClean="0"/>
               <a:pPr/>
-              <a:t>10/11/2018</a:t>
+              <a:t>8/6/2018</a:t>
             </a:fld>
             <a:endParaRPr lang="en-US"/>
           </a:p>
@@ -2145,7 +2132,7 @@
         </p:nvSpPr>
         <p:spPr>
           <a:xfrm>
-            <a:off x="510569" y="205277"/>
+            <a:off x="510570" y="264272"/>
             <a:ext cx="8093365" cy="763525"/>
           </a:xfrm>
         </p:spPr>
@@ -2154,10 +2141,13 @@
             <a:normAutofit/>
           </a:bodyPr>
           <a:lstStyle>
-            <a:lvl1pPr algn="l">
+            <a:lvl1pPr algn="r">
               <a:defRPr sz="3600" baseline="0">
                 <a:solidFill>
-                  <a:schemeClr val="bg1"/>
+                  <a:schemeClr val="accent5">
+                    <a:lumMod val="20000"/>
+                    <a:lumOff val="80000"/>
+                  </a:schemeClr>
                 </a:solidFill>
                 <a:effectLst>
                   <a:outerShdw blurRad="50800" dist="38100" dir="2700000" algn="tl" rotWithShape="0">
@@ -2189,7 +2179,7 @@
         </p:nvSpPr>
         <p:spPr>
           <a:xfrm>
-            <a:off x="522131" y="1581771"/>
+            <a:off x="522131" y="1618649"/>
             <a:ext cx="4040188" cy="479822"/>
           </a:xfrm>
         </p:spPr>
@@ -2200,9 +2190,7 @@
               <a:buNone/>
               <a:defRPr sz="2400" b="1">
                 <a:solidFill>
-                  <a:schemeClr val="tx2">
-                    <a:lumMod val="50000"/>
-                  </a:schemeClr>
+                  <a:schemeClr val="tx1"/>
                 </a:solidFill>
               </a:defRPr>
             </a:lvl1pPr>
@@ -2260,7 +2248,7 @@
         </p:nvSpPr>
         <p:spPr>
           <a:xfrm>
-            <a:off x="522131" y="2054168"/>
+            <a:off x="522131" y="2091046"/>
             <a:ext cx="4040188" cy="2276294"/>
           </a:xfrm>
         </p:spPr>
@@ -2270,45 +2258,35 @@
             <a:lvl1pPr algn="ctr">
               <a:defRPr sz="2400">
                 <a:solidFill>
-                  <a:schemeClr val="tx2">
-                    <a:lumMod val="50000"/>
-                  </a:schemeClr>
+                  <a:schemeClr val="tx1"/>
                 </a:solidFill>
               </a:defRPr>
             </a:lvl1pPr>
             <a:lvl2pPr algn="ctr">
               <a:defRPr sz="2000">
                 <a:solidFill>
-                  <a:schemeClr val="tx2">
-                    <a:lumMod val="50000"/>
-                  </a:schemeClr>
+                  <a:schemeClr val="tx1"/>
                 </a:solidFill>
               </a:defRPr>
             </a:lvl2pPr>
             <a:lvl3pPr algn="ctr">
               <a:defRPr sz="1800">
                 <a:solidFill>
-                  <a:schemeClr val="tx2">
-                    <a:lumMod val="50000"/>
-                  </a:schemeClr>
+                  <a:schemeClr val="tx1"/>
                 </a:solidFill>
               </a:defRPr>
             </a:lvl3pPr>
             <a:lvl4pPr algn="ctr">
               <a:defRPr sz="1600">
                 <a:solidFill>
-                  <a:schemeClr val="tx2">
-                    <a:lumMod val="50000"/>
-                  </a:schemeClr>
+                  <a:schemeClr val="tx1"/>
                 </a:solidFill>
               </a:defRPr>
             </a:lvl4pPr>
             <a:lvl5pPr algn="ctr">
               <a:defRPr sz="1600">
                 <a:solidFill>
-                  <a:schemeClr val="tx2">
-                    <a:lumMod val="50000"/>
-                  </a:schemeClr>
+                  <a:schemeClr val="tx1"/>
                 </a:solidFill>
               </a:defRPr>
             </a:lvl5pPr>
@@ -2374,7 +2352,7 @@
         </p:nvSpPr>
         <p:spPr>
           <a:xfrm>
-            <a:off x="4557252" y="1581771"/>
+            <a:off x="4557252" y="1618649"/>
             <a:ext cx="4041775" cy="479822"/>
           </a:xfrm>
         </p:spPr>
@@ -2385,9 +2363,7 @@
               <a:buNone/>
               <a:defRPr sz="2400" b="1">
                 <a:solidFill>
-                  <a:schemeClr val="tx2">
-                    <a:lumMod val="50000"/>
-                  </a:schemeClr>
+                  <a:schemeClr val="tx1"/>
                 </a:solidFill>
               </a:defRPr>
             </a:lvl1pPr>
@@ -2445,7 +2421,7 @@
         </p:nvSpPr>
         <p:spPr>
           <a:xfrm>
-            <a:off x="4557252" y="2054168"/>
+            <a:off x="4557252" y="2091046"/>
             <a:ext cx="4041775" cy="2276294"/>
           </a:xfrm>
         </p:spPr>
@@ -2455,45 +2431,35 @@
             <a:lvl1pPr algn="ctr">
               <a:defRPr sz="2400">
                 <a:solidFill>
-                  <a:schemeClr val="tx2">
-                    <a:lumMod val="50000"/>
-                  </a:schemeClr>
+                  <a:schemeClr val="tx1"/>
                 </a:solidFill>
               </a:defRPr>
             </a:lvl1pPr>
             <a:lvl2pPr algn="ctr">
               <a:defRPr sz="2000">
                 <a:solidFill>
-                  <a:schemeClr val="tx2">
-                    <a:lumMod val="50000"/>
-                  </a:schemeClr>
+                  <a:schemeClr val="tx1"/>
                 </a:solidFill>
               </a:defRPr>
             </a:lvl2pPr>
             <a:lvl3pPr algn="ctr">
               <a:defRPr sz="1800">
                 <a:solidFill>
-                  <a:schemeClr val="tx2">
-                    <a:lumMod val="50000"/>
-                  </a:schemeClr>
+                  <a:schemeClr val="tx1"/>
                 </a:solidFill>
               </a:defRPr>
             </a:lvl3pPr>
             <a:lvl4pPr algn="ctr">
               <a:defRPr sz="1600">
                 <a:solidFill>
-                  <a:schemeClr val="tx2">
-                    <a:lumMod val="50000"/>
-                  </a:schemeClr>
+                  <a:schemeClr val="tx1"/>
                 </a:solidFill>
               </a:defRPr>
             </a:lvl4pPr>
             <a:lvl5pPr algn="ctr">
               <a:defRPr sz="1600">
                 <a:solidFill>
-                  <a:schemeClr val="tx2">
-                    <a:lumMod val="50000"/>
-                  </a:schemeClr>
+                  <a:schemeClr val="tx1"/>
                 </a:solidFill>
               </a:defRPr>
             </a:lvl5pPr>
@@ -2565,7 +2531,7 @@
             <a:fld id="{53074F12-AA26-4AC8-9962-C36BB8F32554}" type="datetimeFigureOut">
               <a:rPr lang="en-US" smtClean="0"/>
               <a:pPr/>
-              <a:t>10/11/2018</a:t>
+              <a:t>8/6/2018</a:t>
             </a:fld>
             <a:endParaRPr lang="en-US"/>
           </a:p>
@@ -2684,7 +2650,7 @@
             <a:fld id="{53074F12-AA26-4AC8-9962-C36BB8F32554}" type="datetimeFigureOut">
               <a:rPr lang="en-US" smtClean="0"/>
               <a:pPr/>
-              <a:t>10/11/2018</a:t>
+              <a:t>8/6/2018</a:t>
             </a:fld>
             <a:endParaRPr lang="en-US"/>
           </a:p>
@@ -2781,7 +2747,7 @@
             <a:fld id="{53074F12-AA26-4AC8-9962-C36BB8F32554}" type="datetimeFigureOut">
               <a:rPr lang="en-US" smtClean="0"/>
               <a:pPr/>
-              <a:t>10/11/2018</a:t>
+              <a:t>8/6/2018</a:t>
             </a:fld>
             <a:endParaRPr lang="en-US"/>
           </a:p>
@@ -3058,7 +3024,7 @@
             <a:fld id="{53074F12-AA26-4AC8-9962-C36BB8F32554}" type="datetimeFigureOut">
               <a:rPr lang="en-US" smtClean="0"/>
               <a:pPr/>
-              <a:t>10/11/2018</a:t>
+              <a:t>8/6/2018</a:t>
             </a:fld>
             <a:endParaRPr lang="en-US"/>
           </a:p>
@@ -3280,7 +3246,7 @@
             <a:fld id="{53074F12-AA26-4AC8-9962-C36BB8F32554}" type="datetimeFigureOut">
               <a:rPr lang="en-US" smtClean="0"/>
               <a:pPr/>
-              <a:t>10/11/2018</a:t>
+              <a:t>8/6/2018</a:t>
             </a:fld>
             <a:endParaRPr lang="en-US"/>
           </a:p>
@@ -3722,8 +3688,8 @@
         </p:nvSpPr>
         <p:spPr>
           <a:xfrm>
-            <a:off x="567814" y="1777179"/>
-            <a:ext cx="8008376" cy="1496962"/>
+            <a:off x="1585452" y="1968909"/>
+            <a:ext cx="7005484" cy="1496963"/>
           </a:xfrm>
           <a:noFill/>
           <a:effectLst>
@@ -3768,8 +3734,8 @@
         </p:nvSpPr>
         <p:spPr>
           <a:xfrm>
-            <a:off x="575187" y="3318385"/>
-            <a:ext cx="8001000" cy="678426"/>
+            <a:off x="1216742" y="3709220"/>
+            <a:ext cx="7382308" cy="678426"/>
           </a:xfrm>
         </p:spPr>
         <p:txBody>
@@ -3856,7 +3822,7 @@
             </a:pPr>
             <a:r>
               <a:rPr/>
-              <a:t>2022-11-14</a:t>
+              <a:t>2022-11-16</a:t>
             </a:r>
           </a:p>
         </p:txBody>
@@ -3895,8 +3861,8 @@
         </p:nvSpPr>
         <p:spPr>
           <a:xfrm>
-            <a:off x="479616" y="413911"/>
-            <a:ext cx="6474869" cy="725349"/>
+            <a:off x="1885289" y="318046"/>
+            <a:ext cx="6827643" cy="725349"/>
           </a:xfrm>
         </p:spPr>
         <p:txBody>
@@ -3963,7 +3929,7 @@
         </p:nvSpPr>
         <p:spPr>
           <a:xfrm>
-            <a:off x="449824" y="231711"/>
+            <a:off x="464573" y="290705"/>
             <a:ext cx="8259098" cy="763526"/>
           </a:xfrm>
         </p:spPr>
@@ -4053,7 +4019,7 @@
         </p:nvSpPr>
         <p:spPr>
           <a:xfrm>
-            <a:off x="449824" y="231711"/>
+            <a:off x="464573" y="290705"/>
             <a:ext cx="8259098" cy="763526"/>
           </a:xfrm>
         </p:spPr>
@@ -4135,8 +4101,8 @@
         </p:nvSpPr>
         <p:spPr>
           <a:xfrm>
-            <a:off x="479616" y="413911"/>
-            <a:ext cx="6474869" cy="725349"/>
+            <a:off x="1885289" y="318046"/>
+            <a:ext cx="6827643" cy="725349"/>
           </a:xfrm>
         </p:spPr>
         <p:txBody>
@@ -4203,7 +4169,7 @@
         </p:nvSpPr>
         <p:spPr>
           <a:xfrm>
-            <a:off x="449824" y="231711"/>
+            <a:off x="464573" y="290705"/>
             <a:ext cx="8259098" cy="763526"/>
           </a:xfrm>
         </p:spPr>
@@ -4289,8 +4255,8 @@
         </p:blipFill>
         <p:spPr bwMode="auto">
           <a:xfrm>
-            <a:off x="2654300" y="1168400"/>
-            <a:ext cx="3860800" cy="3086100"/>
+            <a:off x="2743200" y="1333500"/>
+            <a:ext cx="3670300" cy="2933700"/>
           </a:xfrm>
           <a:prstGeom prst="rect">
             <a:avLst/>
@@ -4311,7 +4277,7 @@
         </p:nvSpPr>
         <p:spPr>
           <a:xfrm>
-            <a:off x="457200" y="4254500"/>
+            <a:off x="457200" y="4267200"/>
             <a:ext cx="8242300" cy="508000"/>
           </a:xfrm>
           <a:prstGeom prst="rect">
@@ -4375,7 +4341,7 @@
         </p:nvSpPr>
         <p:spPr>
           <a:xfrm>
-            <a:off x="449824" y="231711"/>
+            <a:off x="464573" y="290705"/>
             <a:ext cx="8259098" cy="763526"/>
           </a:xfrm>
         </p:spPr>

</xml_diff>